<commit_message>
Subclasses created (all of them with back_button), waiting txt_files for text_reading/manipulation
</commit_message>
<xml_diff>
--- a/docs/mock-up_origin.pptx
+++ b/docs/mock-up_origin.pptx
@@ -119,6 +119,32 @@
 </p:presentation>
 </file>
 
+<file path=ppt/commentAuthors.xml><?xml version="1.0" encoding="utf-8"?>
+<p:cmAuthorLst xmlns:a="http://schemas.openxmlformats.org/drawingml/2006/main" xmlns:r="http://schemas.openxmlformats.org/officeDocument/2006/relationships" xmlns:p="http://schemas.openxmlformats.org/presentationml/2006/main">
+  <p:cmAuthor id="1" name="Matthew David" initials="MD" lastIdx="1" clrIdx="0">
+    <p:extLst>
+      <p:ext uri="{19B8F6BF-5375-455C-9EA6-DF929625EA0E}">
+        <p15:presenceInfo xmlns:p15="http://schemas.microsoft.com/office/powerpoint/2012/main" userId="e640f234b14b1ccc" providerId="Windows Live"/>
+      </p:ext>
+    </p:extLst>
+  </p:cmAuthor>
+</p:cmAuthorLst>
+</file>
+
+<file path=ppt/comments/comment1.xml><?xml version="1.0" encoding="utf-8"?>
+<p:cmLst xmlns:a="http://schemas.openxmlformats.org/drawingml/2006/main" xmlns:r="http://schemas.openxmlformats.org/officeDocument/2006/relationships" xmlns:p="http://schemas.openxmlformats.org/presentationml/2006/main">
+  <p:cm authorId="1" dt="2021-03-21T12:15:42.960" idx="1">
+    <p:pos x="10" y="10"/>
+    <p:text/>
+    <p:extLst>
+      <p:ext uri="{C676402C-5697-4E1C-873F-D02D1690AC5C}">
+        <p15:threadingInfo xmlns:p15="http://schemas.microsoft.com/office/powerpoint/2012/main" timeZoneBias="-60"/>
+      </p:ext>
+    </p:extLst>
+  </p:cm>
+</p:cmLst>
+</file>
+
 <file path=ppt/slideLayouts/slideLayout1.xml><?xml version="1.0" encoding="utf-8"?>
 <p:sldLayout xmlns:a="http://schemas.openxmlformats.org/drawingml/2006/main" xmlns:r="http://schemas.openxmlformats.org/officeDocument/2006/relationships" xmlns:p="http://schemas.openxmlformats.org/presentationml/2006/main" type="title" preserve="1">
   <p:cSld name="Title Slide">
@@ -266,7 +292,7 @@
           <a:p>
             <a:fld id="{C07DE98C-05B8-4A3D-BF51-B81F0E002F61}" type="datetimeFigureOut">
               <a:rPr lang="en-US" smtClean="0"/>
-              <a:t>3/10/2021</a:t>
+              <a:t>3/21/2021</a:t>
             </a:fld>
             <a:endParaRPr lang="en-US"/>
           </a:p>
@@ -464,7 +490,7 @@
           <a:p>
             <a:fld id="{C07DE98C-05B8-4A3D-BF51-B81F0E002F61}" type="datetimeFigureOut">
               <a:rPr lang="en-US" smtClean="0"/>
-              <a:t>3/10/2021</a:t>
+              <a:t>3/21/2021</a:t>
             </a:fld>
             <a:endParaRPr lang="en-US"/>
           </a:p>
@@ -672,7 +698,7 @@
           <a:p>
             <a:fld id="{C07DE98C-05B8-4A3D-BF51-B81F0E002F61}" type="datetimeFigureOut">
               <a:rPr lang="en-US" smtClean="0"/>
-              <a:t>3/10/2021</a:t>
+              <a:t>3/21/2021</a:t>
             </a:fld>
             <a:endParaRPr lang="en-US"/>
           </a:p>
@@ -870,7 +896,7 @@
           <a:p>
             <a:fld id="{C07DE98C-05B8-4A3D-BF51-B81F0E002F61}" type="datetimeFigureOut">
               <a:rPr lang="en-US" smtClean="0"/>
-              <a:t>3/10/2021</a:t>
+              <a:t>3/21/2021</a:t>
             </a:fld>
             <a:endParaRPr lang="en-US"/>
           </a:p>
@@ -1145,7 +1171,7 @@
           <a:p>
             <a:fld id="{C07DE98C-05B8-4A3D-BF51-B81F0E002F61}" type="datetimeFigureOut">
               <a:rPr lang="en-US" smtClean="0"/>
-              <a:t>3/10/2021</a:t>
+              <a:t>3/21/2021</a:t>
             </a:fld>
             <a:endParaRPr lang="en-US"/>
           </a:p>
@@ -1410,7 +1436,7 @@
           <a:p>
             <a:fld id="{C07DE98C-05B8-4A3D-BF51-B81F0E002F61}" type="datetimeFigureOut">
               <a:rPr lang="en-US" smtClean="0"/>
-              <a:t>3/10/2021</a:t>
+              <a:t>3/21/2021</a:t>
             </a:fld>
             <a:endParaRPr lang="en-US"/>
           </a:p>
@@ -1822,7 +1848,7 @@
           <a:p>
             <a:fld id="{C07DE98C-05B8-4A3D-BF51-B81F0E002F61}" type="datetimeFigureOut">
               <a:rPr lang="en-US" smtClean="0"/>
-              <a:t>3/10/2021</a:t>
+              <a:t>3/21/2021</a:t>
             </a:fld>
             <a:endParaRPr lang="en-US"/>
           </a:p>
@@ -1963,7 +1989,7 @@
           <a:p>
             <a:fld id="{C07DE98C-05B8-4A3D-BF51-B81F0E002F61}" type="datetimeFigureOut">
               <a:rPr lang="en-US" smtClean="0"/>
-              <a:t>3/10/2021</a:t>
+              <a:t>3/21/2021</a:t>
             </a:fld>
             <a:endParaRPr lang="en-US"/>
           </a:p>
@@ -2076,7 +2102,7 @@
           <a:p>
             <a:fld id="{C07DE98C-05B8-4A3D-BF51-B81F0E002F61}" type="datetimeFigureOut">
               <a:rPr lang="en-US" smtClean="0"/>
-              <a:t>3/10/2021</a:t>
+              <a:t>3/21/2021</a:t>
             </a:fld>
             <a:endParaRPr lang="en-US"/>
           </a:p>
@@ -2387,7 +2413,7 @@
           <a:p>
             <a:fld id="{C07DE98C-05B8-4A3D-BF51-B81F0E002F61}" type="datetimeFigureOut">
               <a:rPr lang="en-US" smtClean="0"/>
-              <a:t>3/10/2021</a:t>
+              <a:t>3/21/2021</a:t>
             </a:fld>
             <a:endParaRPr lang="en-US"/>
           </a:p>
@@ -2675,7 +2701,7 @@
           <a:p>
             <a:fld id="{C07DE98C-05B8-4A3D-BF51-B81F0E002F61}" type="datetimeFigureOut">
               <a:rPr lang="en-US" smtClean="0"/>
-              <a:t>3/10/2021</a:t>
+              <a:t>3/21/2021</a:t>
             </a:fld>
             <a:endParaRPr lang="en-US"/>
           </a:p>
@@ -2916,7 +2942,7 @@
           <a:p>
             <a:fld id="{C07DE98C-05B8-4A3D-BF51-B81F0E002F61}" type="datetimeFigureOut">
               <a:rPr lang="en-US" smtClean="0"/>
-              <a:t>3/10/2021</a:t>
+              <a:t>3/21/2021</a:t>
             </a:fld>
             <a:endParaRPr lang="en-US"/>
           </a:p>

</xml_diff>

<commit_message>
ViewListSteps(finished) ; mock_up updated
</commit_message>
<xml_diff>
--- a/docs/mock-up_origin.pptx
+++ b/docs/mock-up_origin.pptx
@@ -13,6 +13,7 @@
     <p:sldId id="264" r:id="rId7"/>
     <p:sldId id="265" r:id="rId8"/>
     <p:sldId id="262" r:id="rId9"/>
+    <p:sldId id="266" r:id="rId10"/>
   </p:sldIdLst>
   <p:sldSz cx="12192000" cy="6858000"/>
   <p:notesSz cx="6858000" cy="9144000"/>
@@ -292,7 +293,7 @@
           <a:p>
             <a:fld id="{C07DE98C-05B8-4A3D-BF51-B81F0E002F61}" type="datetimeFigureOut">
               <a:rPr lang="en-US" smtClean="0"/>
-              <a:t>3/21/2021</a:t>
+              <a:t>3/24/2021</a:t>
             </a:fld>
             <a:endParaRPr lang="en-US"/>
           </a:p>
@@ -490,7 +491,7 @@
           <a:p>
             <a:fld id="{C07DE98C-05B8-4A3D-BF51-B81F0E002F61}" type="datetimeFigureOut">
               <a:rPr lang="en-US" smtClean="0"/>
-              <a:t>3/21/2021</a:t>
+              <a:t>3/24/2021</a:t>
             </a:fld>
             <a:endParaRPr lang="en-US"/>
           </a:p>
@@ -698,7 +699,7 @@
           <a:p>
             <a:fld id="{C07DE98C-05B8-4A3D-BF51-B81F0E002F61}" type="datetimeFigureOut">
               <a:rPr lang="en-US" smtClean="0"/>
-              <a:t>3/21/2021</a:t>
+              <a:t>3/24/2021</a:t>
             </a:fld>
             <a:endParaRPr lang="en-US"/>
           </a:p>
@@ -896,7 +897,7 @@
           <a:p>
             <a:fld id="{C07DE98C-05B8-4A3D-BF51-B81F0E002F61}" type="datetimeFigureOut">
               <a:rPr lang="en-US" smtClean="0"/>
-              <a:t>3/21/2021</a:t>
+              <a:t>3/24/2021</a:t>
             </a:fld>
             <a:endParaRPr lang="en-US"/>
           </a:p>
@@ -1171,7 +1172,7 @@
           <a:p>
             <a:fld id="{C07DE98C-05B8-4A3D-BF51-B81F0E002F61}" type="datetimeFigureOut">
               <a:rPr lang="en-US" smtClean="0"/>
-              <a:t>3/21/2021</a:t>
+              <a:t>3/24/2021</a:t>
             </a:fld>
             <a:endParaRPr lang="en-US"/>
           </a:p>
@@ -1436,7 +1437,7 @@
           <a:p>
             <a:fld id="{C07DE98C-05B8-4A3D-BF51-B81F0E002F61}" type="datetimeFigureOut">
               <a:rPr lang="en-US" smtClean="0"/>
-              <a:t>3/21/2021</a:t>
+              <a:t>3/24/2021</a:t>
             </a:fld>
             <a:endParaRPr lang="en-US"/>
           </a:p>
@@ -1848,7 +1849,7 @@
           <a:p>
             <a:fld id="{C07DE98C-05B8-4A3D-BF51-B81F0E002F61}" type="datetimeFigureOut">
               <a:rPr lang="en-US" smtClean="0"/>
-              <a:t>3/21/2021</a:t>
+              <a:t>3/24/2021</a:t>
             </a:fld>
             <a:endParaRPr lang="en-US"/>
           </a:p>
@@ -1989,7 +1990,7 @@
           <a:p>
             <a:fld id="{C07DE98C-05B8-4A3D-BF51-B81F0E002F61}" type="datetimeFigureOut">
               <a:rPr lang="en-US" smtClean="0"/>
-              <a:t>3/21/2021</a:t>
+              <a:t>3/24/2021</a:t>
             </a:fld>
             <a:endParaRPr lang="en-US"/>
           </a:p>
@@ -2102,7 +2103,7 @@
           <a:p>
             <a:fld id="{C07DE98C-05B8-4A3D-BF51-B81F0E002F61}" type="datetimeFigureOut">
               <a:rPr lang="en-US" smtClean="0"/>
-              <a:t>3/21/2021</a:t>
+              <a:t>3/24/2021</a:t>
             </a:fld>
             <a:endParaRPr lang="en-US"/>
           </a:p>
@@ -2413,7 +2414,7 @@
           <a:p>
             <a:fld id="{C07DE98C-05B8-4A3D-BF51-B81F0E002F61}" type="datetimeFigureOut">
               <a:rPr lang="en-US" smtClean="0"/>
-              <a:t>3/21/2021</a:t>
+              <a:t>3/24/2021</a:t>
             </a:fld>
             <a:endParaRPr lang="en-US"/>
           </a:p>
@@ -2701,7 +2702,7 @@
           <a:p>
             <a:fld id="{C07DE98C-05B8-4A3D-BF51-B81F0E002F61}" type="datetimeFigureOut">
               <a:rPr lang="en-US" smtClean="0"/>
-              <a:t>3/21/2021</a:t>
+              <a:t>3/24/2021</a:t>
             </a:fld>
             <a:endParaRPr lang="en-US"/>
           </a:p>
@@ -2942,7 +2943,7 @@
           <a:p>
             <a:fld id="{C07DE98C-05B8-4A3D-BF51-B81F0E002F61}" type="datetimeFigureOut">
               <a:rPr lang="en-US" smtClean="0"/>
-              <a:t>3/21/2021</a:t>
+              <a:t>3/24/2021</a:t>
             </a:fld>
             <a:endParaRPr lang="en-US"/>
           </a:p>
@@ -8626,6 +8627,1663 @@
 </p:sld>
 </file>
 
+<file path=ppt/slides/slide9.xml><?xml version="1.0" encoding="utf-8"?>
+<p:sld xmlns:a="http://schemas.openxmlformats.org/drawingml/2006/main" xmlns:r="http://schemas.openxmlformats.org/officeDocument/2006/relationships" xmlns:p="http://schemas.openxmlformats.org/presentationml/2006/main">
+  <p:cSld>
+    <p:spTree>
+      <p:nvGrpSpPr>
+        <p:cNvPr id="1" name=""/>
+        <p:cNvGrpSpPr/>
+        <p:nvPr/>
+      </p:nvGrpSpPr>
+      <p:grpSpPr>
+        <a:xfrm>
+          <a:off x="0" y="0"/>
+          <a:ext cx="0" cy="0"/>
+          <a:chOff x="0" y="0"/>
+          <a:chExt cx="0" cy="0"/>
+        </a:xfrm>
+      </p:grpSpPr>
+      <p:sp>
+        <p:nvSpPr>
+          <p:cNvPr id="4" name="Rectangle 3">
+            <a:extLst>
+              <a:ext uri="{FF2B5EF4-FFF2-40B4-BE49-F238E27FC236}">
+                <a16:creationId xmlns:a16="http://schemas.microsoft.com/office/drawing/2014/main" id="{E8BBFF78-C921-46FF-86B4-BADE3C6AB070}"/>
+              </a:ext>
+            </a:extLst>
+          </p:cNvPr>
+          <p:cNvSpPr/>
+          <p:nvPr/>
+        </p:nvSpPr>
+        <p:spPr>
+          <a:xfrm>
+            <a:off x="0" y="0"/>
+            <a:ext cx="12192000" cy="1952625"/>
+          </a:xfrm>
+          <a:prstGeom prst="rect">
+            <a:avLst/>
+          </a:prstGeom>
+          <a:solidFill>
+            <a:schemeClr val="accent2">
+              <a:lumMod val="60000"/>
+              <a:lumOff val="40000"/>
+            </a:schemeClr>
+          </a:solidFill>
+          <a:ln>
+            <a:noFill/>
+          </a:ln>
+        </p:spPr>
+        <p:style>
+          <a:lnRef idx="2">
+            <a:schemeClr val="accent1">
+              <a:shade val="50000"/>
+            </a:schemeClr>
+          </a:lnRef>
+          <a:fillRef idx="1">
+            <a:schemeClr val="accent1"/>
+          </a:fillRef>
+          <a:effectRef idx="0">
+            <a:schemeClr val="accent1"/>
+          </a:effectRef>
+          <a:fontRef idx="minor">
+            <a:schemeClr val="lt1"/>
+          </a:fontRef>
+        </p:style>
+        <p:txBody>
+          <a:bodyPr rtlCol="0" anchor="ctr"/>
+          <a:lstStyle/>
+          <a:p>
+            <a:pPr algn="ctr"/>
+            <a:endParaRPr lang="en-US"/>
+          </a:p>
+        </p:txBody>
+      </p:sp>
+      <p:sp>
+        <p:nvSpPr>
+          <p:cNvPr id="5" name="TextBox 4">
+            <a:extLst>
+              <a:ext uri="{FF2B5EF4-FFF2-40B4-BE49-F238E27FC236}">
+                <a16:creationId xmlns:a16="http://schemas.microsoft.com/office/drawing/2014/main" id="{3846CB6F-98A5-40E8-B77C-260D84E2DEFC}"/>
+              </a:ext>
+            </a:extLst>
+          </p:cNvPr>
+          <p:cNvSpPr txBox="1"/>
+          <p:nvPr/>
+        </p:nvSpPr>
+        <p:spPr>
+          <a:xfrm>
+            <a:off x="3721223" y="622369"/>
+            <a:ext cx="4749554" cy="707886"/>
+          </a:xfrm>
+          <a:prstGeom prst="rect">
+            <a:avLst/>
+          </a:prstGeom>
+          <a:noFill/>
+        </p:spPr>
+        <p:txBody>
+          <a:bodyPr wrap="square" rtlCol="0">
+            <a:spAutoFit/>
+          </a:bodyPr>
+          <a:lstStyle/>
+          <a:p>
+            <a:r>
+              <a:rPr lang="en-US" sz="4000" dirty="0">
+                <a:latin typeface="Aharoni" panose="02010803020104030203" pitchFamily="2" charset="-79"/>
+                <a:cs typeface="Aharoni" panose="02010803020104030203" pitchFamily="2" charset="-79"/>
+              </a:rPr>
+              <a:t>The Kitchen Project</a:t>
+            </a:r>
+          </a:p>
+        </p:txBody>
+      </p:sp>
+      <p:sp>
+        <p:nvSpPr>
+          <p:cNvPr id="14" name="TextBox 13">
+            <a:extLst>
+              <a:ext uri="{FF2B5EF4-FFF2-40B4-BE49-F238E27FC236}">
+                <a16:creationId xmlns:a16="http://schemas.microsoft.com/office/drawing/2014/main" id="{25C725F4-53C0-4F31-9599-D373FFEA5953}"/>
+              </a:ext>
+            </a:extLst>
+          </p:cNvPr>
+          <p:cNvSpPr txBox="1"/>
+          <p:nvPr/>
+        </p:nvSpPr>
+        <p:spPr>
+          <a:xfrm>
+            <a:off x="4773742" y="1330255"/>
+            <a:ext cx="3091874" cy="369332"/>
+          </a:xfrm>
+          <a:prstGeom prst="rect">
+            <a:avLst/>
+          </a:prstGeom>
+          <a:noFill/>
+        </p:spPr>
+        <p:txBody>
+          <a:bodyPr wrap="square" rtlCol="0">
+            <a:spAutoFit/>
+          </a:bodyPr>
+          <a:lstStyle/>
+          <a:p>
+            <a:pPr algn="ctr"/>
+            <a:r>
+              <a:rPr lang="en-US" b="1" dirty="0"/>
+              <a:t>Schedule  - Edit (list </a:t>
+            </a:r>
+            <a:r>
+              <a:rPr lang="en-US" b="1"/>
+              <a:t>or steps)</a:t>
+            </a:r>
+            <a:endParaRPr lang="en-US" b="1" dirty="0"/>
+          </a:p>
+        </p:txBody>
+      </p:sp>
+      <p:sp>
+        <p:nvSpPr>
+          <p:cNvPr id="31" name="Rectangle 30">
+            <a:extLst>
+              <a:ext uri="{FF2B5EF4-FFF2-40B4-BE49-F238E27FC236}">
+                <a16:creationId xmlns:a16="http://schemas.microsoft.com/office/drawing/2014/main" id="{F691F8A9-0E75-43A3-AB9C-D02C3DB4E076}"/>
+              </a:ext>
+            </a:extLst>
+          </p:cNvPr>
+          <p:cNvSpPr/>
+          <p:nvPr/>
+        </p:nvSpPr>
+        <p:spPr>
+          <a:xfrm>
+            <a:off x="4520729" y="2048243"/>
+            <a:ext cx="506027" cy="233109"/>
+          </a:xfrm>
+          <a:prstGeom prst="rect">
+            <a:avLst/>
+          </a:prstGeom>
+          <a:solidFill>
+            <a:schemeClr val="bg1"/>
+          </a:solidFill>
+          <a:ln w="28575">
+            <a:solidFill>
+              <a:schemeClr val="tx1"/>
+            </a:solidFill>
+          </a:ln>
+        </p:spPr>
+        <p:style>
+          <a:lnRef idx="2">
+            <a:schemeClr val="accent1">
+              <a:shade val="50000"/>
+            </a:schemeClr>
+          </a:lnRef>
+          <a:fillRef idx="1">
+            <a:schemeClr val="accent1"/>
+          </a:fillRef>
+          <a:effectRef idx="0">
+            <a:schemeClr val="accent1"/>
+          </a:effectRef>
+          <a:fontRef idx="minor">
+            <a:schemeClr val="lt1"/>
+          </a:fontRef>
+        </p:style>
+        <p:txBody>
+          <a:bodyPr rtlCol="0" anchor="ctr"/>
+          <a:lstStyle/>
+          <a:p>
+            <a:pPr algn="ctr"/>
+            <a:r>
+              <a:rPr lang="en-US" sz="2400" dirty="0">
+                <a:solidFill>
+                  <a:sysClr val="windowText" lastClr="000000"/>
+                </a:solidFill>
+              </a:rPr>
+              <a:t>…</a:t>
+            </a:r>
+          </a:p>
+        </p:txBody>
+      </p:sp>
+      <p:sp>
+        <p:nvSpPr>
+          <p:cNvPr id="30" name="TextBox 29">
+            <a:extLst>
+              <a:ext uri="{FF2B5EF4-FFF2-40B4-BE49-F238E27FC236}">
+                <a16:creationId xmlns:a16="http://schemas.microsoft.com/office/drawing/2014/main" id="{903D1A9A-E806-4491-8080-F2659BD1462C}"/>
+              </a:ext>
+            </a:extLst>
+          </p:cNvPr>
+          <p:cNvSpPr txBox="1"/>
+          <p:nvPr/>
+        </p:nvSpPr>
+        <p:spPr>
+          <a:xfrm>
+            <a:off x="22448" y="110953"/>
+            <a:ext cx="2016896" cy="3416320"/>
+          </a:xfrm>
+          <a:prstGeom prst="rect">
+            <a:avLst/>
+          </a:prstGeom>
+          <a:noFill/>
+        </p:spPr>
+        <p:txBody>
+          <a:bodyPr wrap="square" rtlCol="0">
+            <a:spAutoFit/>
+          </a:bodyPr>
+          <a:lstStyle/>
+          <a:p>
+            <a:r>
+              <a:rPr lang="en-US" sz="1200" u="sng" dirty="0"/>
+              <a:t>… : </a:t>
+            </a:r>
+            <a:r>
+              <a:rPr lang="en-US" sz="1200" dirty="0"/>
+              <a:t>go back // go further</a:t>
+            </a:r>
+            <a:br>
+              <a:rPr lang="en-US" sz="1200" dirty="0"/>
+            </a:br>
+            <a:r>
+              <a:rPr lang="en-US" sz="1200" dirty="0"/>
+              <a:t>if no back/further, then button isn’t displayed</a:t>
+            </a:r>
+            <a:endParaRPr lang="en-US" sz="1200" u="sng" dirty="0"/>
+          </a:p>
+          <a:p>
+            <a:endParaRPr lang="en-US" sz="1200" u="sng" dirty="0"/>
+          </a:p>
+          <a:p>
+            <a:r>
+              <a:rPr lang="en-US" sz="1200" u="sng" dirty="0"/>
+              <a:t>Title : </a:t>
+            </a:r>
+            <a:r>
+              <a:rPr lang="en-US" sz="1200" dirty="0"/>
+              <a:t>black line</a:t>
+            </a:r>
+          </a:p>
+          <a:p>
+            <a:br>
+              <a:rPr lang="en-US" sz="1200" dirty="0"/>
+            </a:br>
+            <a:r>
+              <a:rPr lang="en-US" sz="1200" u="sng" dirty="0"/>
+              <a:t>Small description :</a:t>
+            </a:r>
+            <a:r>
+              <a:rPr lang="en-US" sz="1200" dirty="0"/>
+              <a:t> beneath the black line</a:t>
+            </a:r>
+          </a:p>
+          <a:p>
+            <a:endParaRPr lang="en-US" sz="1200" dirty="0"/>
+          </a:p>
+          <a:p>
+            <a:r>
+              <a:rPr lang="en-US" sz="1200" u="sng" dirty="0"/>
+              <a:t>Small square :</a:t>
+            </a:r>
+            <a:br>
+              <a:rPr lang="en-US" sz="1200" dirty="0"/>
+            </a:br>
+            <a:r>
+              <a:rPr lang="en-US" sz="1200" dirty="0"/>
+              <a:t>picture of the recipes</a:t>
+            </a:r>
+          </a:p>
+          <a:p>
+            <a:endParaRPr lang="en-US" sz="1200" dirty="0"/>
+          </a:p>
+          <a:p>
+            <a:r>
+              <a:rPr lang="en-US" sz="1200" dirty="0"/>
+              <a:t>Switch buttons:</a:t>
+            </a:r>
+          </a:p>
+          <a:p>
+            <a:r>
+              <a:rPr lang="en-US" sz="1200" dirty="0" err="1"/>
+              <a:t>Clic</a:t>
+            </a:r>
+            <a:r>
+              <a:rPr lang="en-US" sz="1200" dirty="0"/>
+              <a:t> on one of them (change in green)</a:t>
+            </a:r>
+            <a:br>
+              <a:rPr lang="en-US" sz="1200" dirty="0"/>
+            </a:br>
+            <a:r>
+              <a:rPr lang="en-US" sz="1200" dirty="0" err="1"/>
+              <a:t>Clic</a:t>
+            </a:r>
+            <a:r>
+              <a:rPr lang="en-US" sz="1200" dirty="0"/>
+              <a:t> on the second (turn back red but the two that were cliqued on are now switched</a:t>
+            </a:r>
+          </a:p>
+        </p:txBody>
+      </p:sp>
+      <p:sp>
+        <p:nvSpPr>
+          <p:cNvPr id="2" name="Rectangle 1">
+            <a:extLst>
+              <a:ext uri="{FF2B5EF4-FFF2-40B4-BE49-F238E27FC236}">
+                <a16:creationId xmlns:a16="http://schemas.microsoft.com/office/drawing/2014/main" id="{3A6E0AB9-596A-4C07-9F0C-F1A0BF2F87E2}"/>
+              </a:ext>
+            </a:extLst>
+          </p:cNvPr>
+          <p:cNvSpPr/>
+          <p:nvPr/>
+        </p:nvSpPr>
+        <p:spPr>
+          <a:xfrm>
+            <a:off x="2102304" y="2335358"/>
+            <a:ext cx="5342878" cy="832877"/>
+          </a:xfrm>
+          <a:prstGeom prst="rect">
+            <a:avLst/>
+          </a:prstGeom>
+          <a:solidFill>
+            <a:schemeClr val="bg1">
+              <a:lumMod val="95000"/>
+            </a:schemeClr>
+          </a:solidFill>
+        </p:spPr>
+        <p:style>
+          <a:lnRef idx="2">
+            <a:schemeClr val="accent1">
+              <a:shade val="50000"/>
+            </a:schemeClr>
+          </a:lnRef>
+          <a:fillRef idx="1">
+            <a:schemeClr val="accent1"/>
+          </a:fillRef>
+          <a:effectRef idx="0">
+            <a:schemeClr val="accent1"/>
+          </a:effectRef>
+          <a:fontRef idx="minor">
+            <a:schemeClr val="lt1"/>
+          </a:fontRef>
+        </p:style>
+        <p:txBody>
+          <a:bodyPr rtlCol="0" anchor="ctr"/>
+          <a:lstStyle/>
+          <a:p>
+            <a:pPr algn="ctr"/>
+            <a:endParaRPr lang="en-US" dirty="0"/>
+          </a:p>
+        </p:txBody>
+      </p:sp>
+      <p:sp>
+        <p:nvSpPr>
+          <p:cNvPr id="12" name="Rectangle 11">
+            <a:extLst>
+              <a:ext uri="{FF2B5EF4-FFF2-40B4-BE49-F238E27FC236}">
+                <a16:creationId xmlns:a16="http://schemas.microsoft.com/office/drawing/2014/main" id="{B2C0982C-92D4-4E16-8239-D0EB2B3DC2E3}"/>
+              </a:ext>
+            </a:extLst>
+          </p:cNvPr>
+          <p:cNvSpPr/>
+          <p:nvPr/>
+        </p:nvSpPr>
+        <p:spPr>
+          <a:xfrm>
+            <a:off x="2102304" y="5695334"/>
+            <a:ext cx="5342878" cy="832877"/>
+          </a:xfrm>
+          <a:prstGeom prst="rect">
+            <a:avLst/>
+          </a:prstGeom>
+          <a:solidFill>
+            <a:schemeClr val="bg1">
+              <a:lumMod val="95000"/>
+            </a:schemeClr>
+          </a:solidFill>
+        </p:spPr>
+        <p:style>
+          <a:lnRef idx="2">
+            <a:schemeClr val="accent1">
+              <a:shade val="50000"/>
+            </a:schemeClr>
+          </a:lnRef>
+          <a:fillRef idx="1">
+            <a:schemeClr val="accent1"/>
+          </a:fillRef>
+          <a:effectRef idx="0">
+            <a:schemeClr val="accent1"/>
+          </a:effectRef>
+          <a:fontRef idx="minor">
+            <a:schemeClr val="lt1"/>
+          </a:fontRef>
+        </p:style>
+        <p:txBody>
+          <a:bodyPr rtlCol="0" anchor="ctr"/>
+          <a:lstStyle/>
+          <a:p>
+            <a:pPr algn="ctr"/>
+            <a:endParaRPr lang="en-US"/>
+          </a:p>
+        </p:txBody>
+      </p:sp>
+      <p:sp>
+        <p:nvSpPr>
+          <p:cNvPr id="13" name="Rectangle 12">
+            <a:extLst>
+              <a:ext uri="{FF2B5EF4-FFF2-40B4-BE49-F238E27FC236}">
+                <a16:creationId xmlns:a16="http://schemas.microsoft.com/office/drawing/2014/main" id="{49251613-3EDF-4020-B50A-F0650D97F914}"/>
+              </a:ext>
+            </a:extLst>
+          </p:cNvPr>
+          <p:cNvSpPr/>
+          <p:nvPr/>
+        </p:nvSpPr>
+        <p:spPr>
+          <a:xfrm>
+            <a:off x="2102304" y="4575342"/>
+            <a:ext cx="5342878" cy="832877"/>
+          </a:xfrm>
+          <a:prstGeom prst="rect">
+            <a:avLst/>
+          </a:prstGeom>
+          <a:solidFill>
+            <a:schemeClr val="bg1">
+              <a:lumMod val="95000"/>
+            </a:schemeClr>
+          </a:solidFill>
+        </p:spPr>
+        <p:style>
+          <a:lnRef idx="2">
+            <a:schemeClr val="accent1">
+              <a:shade val="50000"/>
+            </a:schemeClr>
+          </a:lnRef>
+          <a:fillRef idx="1">
+            <a:schemeClr val="accent1"/>
+          </a:fillRef>
+          <a:effectRef idx="0">
+            <a:schemeClr val="accent1"/>
+          </a:effectRef>
+          <a:fontRef idx="minor">
+            <a:schemeClr val="lt1"/>
+          </a:fontRef>
+        </p:style>
+        <p:txBody>
+          <a:bodyPr rtlCol="0" anchor="ctr"/>
+          <a:lstStyle/>
+          <a:p>
+            <a:pPr algn="ctr"/>
+            <a:endParaRPr lang="en-US"/>
+          </a:p>
+        </p:txBody>
+      </p:sp>
+      <p:sp>
+        <p:nvSpPr>
+          <p:cNvPr id="15" name="Rectangle 14">
+            <a:extLst>
+              <a:ext uri="{FF2B5EF4-FFF2-40B4-BE49-F238E27FC236}">
+                <a16:creationId xmlns:a16="http://schemas.microsoft.com/office/drawing/2014/main" id="{E0DC3BCC-764F-41E2-8525-F74B18F5AE04}"/>
+              </a:ext>
+            </a:extLst>
+          </p:cNvPr>
+          <p:cNvSpPr/>
+          <p:nvPr/>
+        </p:nvSpPr>
+        <p:spPr>
+          <a:xfrm>
+            <a:off x="2102304" y="3455350"/>
+            <a:ext cx="5342878" cy="832877"/>
+          </a:xfrm>
+          <a:prstGeom prst="rect">
+            <a:avLst/>
+          </a:prstGeom>
+          <a:solidFill>
+            <a:schemeClr val="bg1">
+              <a:lumMod val="95000"/>
+            </a:schemeClr>
+          </a:solidFill>
+        </p:spPr>
+        <p:style>
+          <a:lnRef idx="2">
+            <a:schemeClr val="accent1">
+              <a:shade val="50000"/>
+            </a:schemeClr>
+          </a:lnRef>
+          <a:fillRef idx="1">
+            <a:schemeClr val="accent1"/>
+          </a:fillRef>
+          <a:effectRef idx="0">
+            <a:schemeClr val="accent1"/>
+          </a:effectRef>
+          <a:fontRef idx="minor">
+            <a:schemeClr val="lt1"/>
+          </a:fontRef>
+        </p:style>
+        <p:txBody>
+          <a:bodyPr rtlCol="0" anchor="ctr"/>
+          <a:lstStyle/>
+          <a:p>
+            <a:pPr algn="ctr"/>
+            <a:endParaRPr lang="en-US"/>
+          </a:p>
+        </p:txBody>
+      </p:sp>
+      <p:sp>
+        <p:nvSpPr>
+          <p:cNvPr id="20" name="Rectangle 19">
+            <a:extLst>
+              <a:ext uri="{FF2B5EF4-FFF2-40B4-BE49-F238E27FC236}">
+                <a16:creationId xmlns:a16="http://schemas.microsoft.com/office/drawing/2014/main" id="{BA111713-C79D-4109-9755-57DA34B08434}"/>
+              </a:ext>
+            </a:extLst>
+          </p:cNvPr>
+          <p:cNvSpPr/>
+          <p:nvPr/>
+        </p:nvSpPr>
+        <p:spPr>
+          <a:xfrm>
+            <a:off x="2169089" y="2391796"/>
+            <a:ext cx="720000" cy="720000"/>
+          </a:xfrm>
+          <a:prstGeom prst="rect">
+            <a:avLst/>
+          </a:prstGeom>
+          <a:solidFill>
+            <a:schemeClr val="bg1">
+              <a:lumMod val="85000"/>
+            </a:schemeClr>
+          </a:solidFill>
+        </p:spPr>
+        <p:style>
+          <a:lnRef idx="2">
+            <a:schemeClr val="accent1">
+              <a:shade val="50000"/>
+            </a:schemeClr>
+          </a:lnRef>
+          <a:fillRef idx="1">
+            <a:schemeClr val="accent1"/>
+          </a:fillRef>
+          <a:effectRef idx="0">
+            <a:schemeClr val="accent1"/>
+          </a:effectRef>
+          <a:fontRef idx="minor">
+            <a:schemeClr val="lt1"/>
+          </a:fontRef>
+        </p:style>
+        <p:txBody>
+          <a:bodyPr rtlCol="0" anchor="ctr"/>
+          <a:lstStyle/>
+          <a:p>
+            <a:pPr algn="ctr"/>
+            <a:endParaRPr lang="en-US"/>
+          </a:p>
+        </p:txBody>
+      </p:sp>
+      <p:sp>
+        <p:nvSpPr>
+          <p:cNvPr id="21" name="Rectangle 20">
+            <a:extLst>
+              <a:ext uri="{FF2B5EF4-FFF2-40B4-BE49-F238E27FC236}">
+                <a16:creationId xmlns:a16="http://schemas.microsoft.com/office/drawing/2014/main" id="{398A8AAE-5C69-485C-9FAE-31711CC31AA4}"/>
+              </a:ext>
+            </a:extLst>
+          </p:cNvPr>
+          <p:cNvSpPr/>
+          <p:nvPr/>
+        </p:nvSpPr>
+        <p:spPr>
+          <a:xfrm>
+            <a:off x="2169089" y="3511788"/>
+            <a:ext cx="720000" cy="720000"/>
+          </a:xfrm>
+          <a:prstGeom prst="rect">
+            <a:avLst/>
+          </a:prstGeom>
+          <a:solidFill>
+            <a:schemeClr val="bg1">
+              <a:lumMod val="85000"/>
+            </a:schemeClr>
+          </a:solidFill>
+        </p:spPr>
+        <p:style>
+          <a:lnRef idx="2">
+            <a:schemeClr val="accent1">
+              <a:shade val="50000"/>
+            </a:schemeClr>
+          </a:lnRef>
+          <a:fillRef idx="1">
+            <a:schemeClr val="accent1"/>
+          </a:fillRef>
+          <a:effectRef idx="0">
+            <a:schemeClr val="accent1"/>
+          </a:effectRef>
+          <a:fontRef idx="minor">
+            <a:schemeClr val="lt1"/>
+          </a:fontRef>
+        </p:style>
+        <p:txBody>
+          <a:bodyPr rtlCol="0" anchor="ctr"/>
+          <a:lstStyle/>
+          <a:p>
+            <a:pPr algn="ctr"/>
+            <a:endParaRPr lang="en-US"/>
+          </a:p>
+        </p:txBody>
+      </p:sp>
+      <p:sp>
+        <p:nvSpPr>
+          <p:cNvPr id="22" name="Rectangle 21">
+            <a:extLst>
+              <a:ext uri="{FF2B5EF4-FFF2-40B4-BE49-F238E27FC236}">
+                <a16:creationId xmlns:a16="http://schemas.microsoft.com/office/drawing/2014/main" id="{D113FA5E-D86E-48A9-B04B-BE72F21AA2AB}"/>
+              </a:ext>
+            </a:extLst>
+          </p:cNvPr>
+          <p:cNvSpPr/>
+          <p:nvPr/>
+        </p:nvSpPr>
+        <p:spPr>
+          <a:xfrm>
+            <a:off x="2169089" y="5751772"/>
+            <a:ext cx="720000" cy="720000"/>
+          </a:xfrm>
+          <a:prstGeom prst="rect">
+            <a:avLst/>
+          </a:prstGeom>
+          <a:solidFill>
+            <a:schemeClr val="bg1">
+              <a:lumMod val="85000"/>
+            </a:schemeClr>
+          </a:solidFill>
+        </p:spPr>
+        <p:style>
+          <a:lnRef idx="2">
+            <a:schemeClr val="accent1">
+              <a:shade val="50000"/>
+            </a:schemeClr>
+          </a:lnRef>
+          <a:fillRef idx="1">
+            <a:schemeClr val="accent1"/>
+          </a:fillRef>
+          <a:effectRef idx="0">
+            <a:schemeClr val="accent1"/>
+          </a:effectRef>
+          <a:fontRef idx="minor">
+            <a:schemeClr val="lt1"/>
+          </a:fontRef>
+        </p:style>
+        <p:txBody>
+          <a:bodyPr rtlCol="0" anchor="ctr"/>
+          <a:lstStyle/>
+          <a:p>
+            <a:pPr algn="ctr"/>
+            <a:endParaRPr lang="en-US"/>
+          </a:p>
+        </p:txBody>
+      </p:sp>
+      <p:sp>
+        <p:nvSpPr>
+          <p:cNvPr id="23" name="Rectangle 22">
+            <a:extLst>
+              <a:ext uri="{FF2B5EF4-FFF2-40B4-BE49-F238E27FC236}">
+                <a16:creationId xmlns:a16="http://schemas.microsoft.com/office/drawing/2014/main" id="{3264DDAC-9171-4126-AB0A-4C30ED68467F}"/>
+              </a:ext>
+            </a:extLst>
+          </p:cNvPr>
+          <p:cNvSpPr/>
+          <p:nvPr/>
+        </p:nvSpPr>
+        <p:spPr>
+          <a:xfrm>
+            <a:off x="2169089" y="4631780"/>
+            <a:ext cx="720000" cy="720000"/>
+          </a:xfrm>
+          <a:prstGeom prst="rect">
+            <a:avLst/>
+          </a:prstGeom>
+          <a:solidFill>
+            <a:schemeClr val="bg1">
+              <a:lumMod val="85000"/>
+            </a:schemeClr>
+          </a:solidFill>
+        </p:spPr>
+        <p:style>
+          <a:lnRef idx="2">
+            <a:schemeClr val="accent1">
+              <a:shade val="50000"/>
+            </a:schemeClr>
+          </a:lnRef>
+          <a:fillRef idx="1">
+            <a:schemeClr val="accent1"/>
+          </a:fillRef>
+          <a:effectRef idx="0">
+            <a:schemeClr val="accent1"/>
+          </a:effectRef>
+          <a:fontRef idx="minor">
+            <a:schemeClr val="lt1"/>
+          </a:fontRef>
+        </p:style>
+        <p:txBody>
+          <a:bodyPr rtlCol="0" anchor="ctr"/>
+          <a:lstStyle/>
+          <a:p>
+            <a:pPr algn="ctr"/>
+            <a:endParaRPr lang="en-US"/>
+          </a:p>
+        </p:txBody>
+      </p:sp>
+      <p:cxnSp>
+        <p:nvCxnSpPr>
+          <p:cNvPr id="25" name="Straight Connector 24">
+            <a:extLst>
+              <a:ext uri="{FF2B5EF4-FFF2-40B4-BE49-F238E27FC236}">
+                <a16:creationId xmlns:a16="http://schemas.microsoft.com/office/drawing/2014/main" id="{EB82AC94-06A5-45BE-A634-BBB1FC229EA1}"/>
+              </a:ext>
+            </a:extLst>
+          </p:cNvPr>
+          <p:cNvCxnSpPr>
+            <a:cxnSpLocks/>
+          </p:cNvCxnSpPr>
+          <p:nvPr/>
+        </p:nvCxnSpPr>
+        <p:spPr>
+          <a:xfrm>
+            <a:off x="3018834" y="2492741"/>
+            <a:ext cx="4129686" cy="0"/>
+          </a:xfrm>
+          <a:prstGeom prst="line">
+            <a:avLst/>
+          </a:prstGeom>
+          <a:ln w="76200">
+            <a:solidFill>
+              <a:schemeClr val="tx1"/>
+            </a:solidFill>
+          </a:ln>
+        </p:spPr>
+        <p:style>
+          <a:lnRef idx="1">
+            <a:schemeClr val="accent1"/>
+          </a:lnRef>
+          <a:fillRef idx="0">
+            <a:schemeClr val="accent1"/>
+          </a:fillRef>
+          <a:effectRef idx="0">
+            <a:schemeClr val="accent1"/>
+          </a:effectRef>
+          <a:fontRef idx="minor">
+            <a:schemeClr val="tx1"/>
+          </a:fontRef>
+        </p:style>
+      </p:cxnSp>
+      <p:cxnSp>
+        <p:nvCxnSpPr>
+          <p:cNvPr id="27" name="Straight Connector 26">
+            <a:extLst>
+              <a:ext uri="{FF2B5EF4-FFF2-40B4-BE49-F238E27FC236}">
+                <a16:creationId xmlns:a16="http://schemas.microsoft.com/office/drawing/2014/main" id="{6DAF0F3A-5344-4C01-97E4-5983502514EF}"/>
+              </a:ext>
+            </a:extLst>
+          </p:cNvPr>
+          <p:cNvCxnSpPr>
+            <a:cxnSpLocks/>
+          </p:cNvCxnSpPr>
+          <p:nvPr/>
+        </p:nvCxnSpPr>
+        <p:spPr>
+          <a:xfrm>
+            <a:off x="3018834" y="3614960"/>
+            <a:ext cx="4129686" cy="0"/>
+          </a:xfrm>
+          <a:prstGeom prst="line">
+            <a:avLst/>
+          </a:prstGeom>
+          <a:ln w="76200">
+            <a:solidFill>
+              <a:schemeClr val="tx1"/>
+            </a:solidFill>
+          </a:ln>
+        </p:spPr>
+        <p:style>
+          <a:lnRef idx="1">
+            <a:schemeClr val="accent1"/>
+          </a:lnRef>
+          <a:fillRef idx="0">
+            <a:schemeClr val="accent1"/>
+          </a:fillRef>
+          <a:effectRef idx="0">
+            <a:schemeClr val="accent1"/>
+          </a:effectRef>
+          <a:fontRef idx="minor">
+            <a:schemeClr val="tx1"/>
+          </a:fontRef>
+        </p:style>
+      </p:cxnSp>
+      <p:cxnSp>
+        <p:nvCxnSpPr>
+          <p:cNvPr id="28" name="Straight Connector 27">
+            <a:extLst>
+              <a:ext uri="{FF2B5EF4-FFF2-40B4-BE49-F238E27FC236}">
+                <a16:creationId xmlns:a16="http://schemas.microsoft.com/office/drawing/2014/main" id="{32524D3F-A593-4678-B7CA-69AF64054EFF}"/>
+              </a:ext>
+            </a:extLst>
+          </p:cNvPr>
+          <p:cNvCxnSpPr>
+            <a:cxnSpLocks/>
+          </p:cNvCxnSpPr>
+          <p:nvPr/>
+        </p:nvCxnSpPr>
+        <p:spPr>
+          <a:xfrm>
+            <a:off x="3018834" y="5868631"/>
+            <a:ext cx="4129686" cy="0"/>
+          </a:xfrm>
+          <a:prstGeom prst="line">
+            <a:avLst/>
+          </a:prstGeom>
+          <a:ln w="76200">
+            <a:solidFill>
+              <a:schemeClr val="tx1"/>
+            </a:solidFill>
+          </a:ln>
+        </p:spPr>
+        <p:style>
+          <a:lnRef idx="1">
+            <a:schemeClr val="accent1"/>
+          </a:lnRef>
+          <a:fillRef idx="0">
+            <a:schemeClr val="accent1"/>
+          </a:fillRef>
+          <a:effectRef idx="0">
+            <a:schemeClr val="accent1"/>
+          </a:effectRef>
+          <a:fontRef idx="minor">
+            <a:schemeClr val="tx1"/>
+          </a:fontRef>
+        </p:style>
+      </p:cxnSp>
+      <p:cxnSp>
+        <p:nvCxnSpPr>
+          <p:cNvPr id="29" name="Straight Connector 28">
+            <a:extLst>
+              <a:ext uri="{FF2B5EF4-FFF2-40B4-BE49-F238E27FC236}">
+                <a16:creationId xmlns:a16="http://schemas.microsoft.com/office/drawing/2014/main" id="{1CCF1E70-58B9-453F-88C0-B896719F8B77}"/>
+              </a:ext>
+            </a:extLst>
+          </p:cNvPr>
+          <p:cNvCxnSpPr>
+            <a:cxnSpLocks/>
+          </p:cNvCxnSpPr>
+          <p:nvPr/>
+        </p:nvCxnSpPr>
+        <p:spPr>
+          <a:xfrm>
+            <a:off x="3018834" y="4764887"/>
+            <a:ext cx="4129686" cy="0"/>
+          </a:xfrm>
+          <a:prstGeom prst="line">
+            <a:avLst/>
+          </a:prstGeom>
+          <a:ln w="76200">
+            <a:solidFill>
+              <a:schemeClr val="tx1"/>
+            </a:solidFill>
+          </a:ln>
+        </p:spPr>
+        <p:style>
+          <a:lnRef idx="1">
+            <a:schemeClr val="accent1"/>
+          </a:lnRef>
+          <a:fillRef idx="0">
+            <a:schemeClr val="accent1"/>
+          </a:fillRef>
+          <a:effectRef idx="0">
+            <a:schemeClr val="accent1"/>
+          </a:effectRef>
+          <a:fontRef idx="minor">
+            <a:schemeClr val="tx1"/>
+          </a:fontRef>
+        </p:style>
+      </p:cxnSp>
+      <p:sp>
+        <p:nvSpPr>
+          <p:cNvPr id="32" name="Rectangle 31">
+            <a:extLst>
+              <a:ext uri="{FF2B5EF4-FFF2-40B4-BE49-F238E27FC236}">
+                <a16:creationId xmlns:a16="http://schemas.microsoft.com/office/drawing/2014/main" id="{311085B3-0BEA-4DC3-8C42-3B0171D12376}"/>
+              </a:ext>
+            </a:extLst>
+          </p:cNvPr>
+          <p:cNvSpPr/>
+          <p:nvPr/>
+        </p:nvSpPr>
+        <p:spPr>
+          <a:xfrm>
+            <a:off x="4520728" y="6624891"/>
+            <a:ext cx="506027" cy="233109"/>
+          </a:xfrm>
+          <a:prstGeom prst="rect">
+            <a:avLst/>
+          </a:prstGeom>
+          <a:solidFill>
+            <a:schemeClr val="bg1"/>
+          </a:solidFill>
+          <a:ln w="28575">
+            <a:solidFill>
+              <a:schemeClr val="tx1"/>
+            </a:solidFill>
+          </a:ln>
+        </p:spPr>
+        <p:style>
+          <a:lnRef idx="2">
+            <a:schemeClr val="accent1">
+              <a:shade val="50000"/>
+            </a:schemeClr>
+          </a:lnRef>
+          <a:fillRef idx="1">
+            <a:schemeClr val="accent1"/>
+          </a:fillRef>
+          <a:effectRef idx="0">
+            <a:schemeClr val="accent1"/>
+          </a:effectRef>
+          <a:fontRef idx="minor">
+            <a:schemeClr val="lt1"/>
+          </a:fontRef>
+        </p:style>
+        <p:txBody>
+          <a:bodyPr rtlCol="0" anchor="ctr"/>
+          <a:lstStyle/>
+          <a:p>
+            <a:pPr algn="ctr"/>
+            <a:r>
+              <a:rPr lang="en-US" sz="2400" dirty="0">
+                <a:solidFill>
+                  <a:sysClr val="windowText" lastClr="000000"/>
+                </a:solidFill>
+              </a:rPr>
+              <a:t>…</a:t>
+            </a:r>
+          </a:p>
+        </p:txBody>
+      </p:sp>
+      <p:sp>
+        <p:nvSpPr>
+          <p:cNvPr id="7" name="Rectangle 6">
+            <a:extLst>
+              <a:ext uri="{FF2B5EF4-FFF2-40B4-BE49-F238E27FC236}">
+                <a16:creationId xmlns:a16="http://schemas.microsoft.com/office/drawing/2014/main" id="{CC1DBABE-848C-4B40-8AE0-EA54EC807E78}"/>
+              </a:ext>
+            </a:extLst>
+          </p:cNvPr>
+          <p:cNvSpPr/>
+          <p:nvPr/>
+        </p:nvSpPr>
+        <p:spPr>
+          <a:xfrm>
+            <a:off x="7643674" y="2335358"/>
+            <a:ext cx="1260000" cy="831600"/>
+          </a:xfrm>
+          <a:prstGeom prst="rect">
+            <a:avLst/>
+          </a:prstGeom>
+          <a:solidFill>
+            <a:srgbClr val="FF0000"/>
+          </a:solidFill>
+          <a:ln>
+            <a:noFill/>
+          </a:ln>
+          <a:effectLst>
+            <a:outerShdw blurRad="44450" dist="27940" dir="5400000" algn="ctr">
+              <a:srgbClr val="000000">
+                <a:alpha val="32000"/>
+              </a:srgbClr>
+            </a:outerShdw>
+          </a:effectLst>
+          <a:scene3d>
+            <a:camera prst="orthographicFront">
+              <a:rot lat="0" lon="0" rev="0"/>
+            </a:camera>
+            <a:lightRig rig="balanced" dir="t">
+              <a:rot lat="0" lon="0" rev="8700000"/>
+            </a:lightRig>
+          </a:scene3d>
+          <a:sp3d>
+            <a:bevelT w="190500" h="38100"/>
+          </a:sp3d>
+        </p:spPr>
+        <p:style>
+          <a:lnRef idx="2">
+            <a:schemeClr val="accent1">
+              <a:shade val="50000"/>
+            </a:schemeClr>
+          </a:lnRef>
+          <a:fillRef idx="1">
+            <a:schemeClr val="accent1"/>
+          </a:fillRef>
+          <a:effectRef idx="0">
+            <a:schemeClr val="accent1"/>
+          </a:effectRef>
+          <a:fontRef idx="minor">
+            <a:schemeClr val="lt1"/>
+          </a:fontRef>
+        </p:style>
+        <p:txBody>
+          <a:bodyPr rtlCol="0" anchor="ctr"/>
+          <a:lstStyle/>
+          <a:p>
+            <a:pPr algn="ctr"/>
+            <a:r>
+              <a:rPr lang="en-US" dirty="0"/>
+              <a:t>Switch</a:t>
+            </a:r>
+          </a:p>
+        </p:txBody>
+      </p:sp>
+      <p:sp>
+        <p:nvSpPr>
+          <p:cNvPr id="35" name="Rectangle 34">
+            <a:extLst>
+              <a:ext uri="{FF2B5EF4-FFF2-40B4-BE49-F238E27FC236}">
+                <a16:creationId xmlns:a16="http://schemas.microsoft.com/office/drawing/2014/main" id="{26FF283A-413F-4F5A-8273-1F63E93BF6E5}"/>
+              </a:ext>
+            </a:extLst>
+          </p:cNvPr>
+          <p:cNvSpPr/>
+          <p:nvPr/>
+        </p:nvSpPr>
+        <p:spPr>
+          <a:xfrm>
+            <a:off x="7643674" y="3451084"/>
+            <a:ext cx="1260000" cy="831600"/>
+          </a:xfrm>
+          <a:prstGeom prst="rect">
+            <a:avLst/>
+          </a:prstGeom>
+          <a:solidFill>
+            <a:srgbClr val="FF0000"/>
+          </a:solidFill>
+          <a:ln>
+            <a:noFill/>
+          </a:ln>
+          <a:effectLst>
+            <a:outerShdw blurRad="44450" dist="27940" dir="5400000" algn="ctr">
+              <a:srgbClr val="000000">
+                <a:alpha val="32000"/>
+              </a:srgbClr>
+            </a:outerShdw>
+          </a:effectLst>
+          <a:scene3d>
+            <a:camera prst="orthographicFront">
+              <a:rot lat="0" lon="0" rev="0"/>
+            </a:camera>
+            <a:lightRig rig="balanced" dir="t">
+              <a:rot lat="0" lon="0" rev="8700000"/>
+            </a:lightRig>
+          </a:scene3d>
+          <a:sp3d>
+            <a:bevelT w="190500" h="38100"/>
+          </a:sp3d>
+        </p:spPr>
+        <p:style>
+          <a:lnRef idx="2">
+            <a:schemeClr val="accent1">
+              <a:shade val="50000"/>
+            </a:schemeClr>
+          </a:lnRef>
+          <a:fillRef idx="1">
+            <a:schemeClr val="accent1"/>
+          </a:fillRef>
+          <a:effectRef idx="0">
+            <a:schemeClr val="accent1"/>
+          </a:effectRef>
+          <a:fontRef idx="minor">
+            <a:schemeClr val="lt1"/>
+          </a:fontRef>
+        </p:style>
+        <p:txBody>
+          <a:bodyPr rtlCol="0" anchor="ctr"/>
+          <a:lstStyle/>
+          <a:p>
+            <a:pPr algn="ctr"/>
+            <a:r>
+              <a:rPr lang="en-US" dirty="0"/>
+              <a:t>Switch</a:t>
+            </a:r>
+          </a:p>
+        </p:txBody>
+      </p:sp>
+      <p:sp>
+        <p:nvSpPr>
+          <p:cNvPr id="36" name="Rectangle 35">
+            <a:extLst>
+              <a:ext uri="{FF2B5EF4-FFF2-40B4-BE49-F238E27FC236}">
+                <a16:creationId xmlns:a16="http://schemas.microsoft.com/office/drawing/2014/main" id="{1CE4F8EC-B2AF-4B8E-B1BD-A46C0D9BA689}"/>
+              </a:ext>
+            </a:extLst>
+          </p:cNvPr>
+          <p:cNvSpPr/>
+          <p:nvPr/>
+        </p:nvSpPr>
+        <p:spPr>
+          <a:xfrm>
+            <a:off x="7643674" y="4576619"/>
+            <a:ext cx="1260000" cy="831600"/>
+          </a:xfrm>
+          <a:prstGeom prst="rect">
+            <a:avLst/>
+          </a:prstGeom>
+          <a:solidFill>
+            <a:srgbClr val="FF0000"/>
+          </a:solidFill>
+          <a:ln>
+            <a:noFill/>
+          </a:ln>
+          <a:effectLst>
+            <a:outerShdw blurRad="44450" dist="27940" dir="5400000" algn="ctr">
+              <a:srgbClr val="000000">
+                <a:alpha val="32000"/>
+              </a:srgbClr>
+            </a:outerShdw>
+          </a:effectLst>
+          <a:scene3d>
+            <a:camera prst="orthographicFront">
+              <a:rot lat="0" lon="0" rev="0"/>
+            </a:camera>
+            <a:lightRig rig="balanced" dir="t">
+              <a:rot lat="0" lon="0" rev="8700000"/>
+            </a:lightRig>
+          </a:scene3d>
+          <a:sp3d>
+            <a:bevelT w="190500" h="38100"/>
+          </a:sp3d>
+        </p:spPr>
+        <p:style>
+          <a:lnRef idx="2">
+            <a:schemeClr val="accent1">
+              <a:shade val="50000"/>
+            </a:schemeClr>
+          </a:lnRef>
+          <a:fillRef idx="1">
+            <a:schemeClr val="accent1"/>
+          </a:fillRef>
+          <a:effectRef idx="0">
+            <a:schemeClr val="accent1"/>
+          </a:effectRef>
+          <a:fontRef idx="minor">
+            <a:schemeClr val="lt1"/>
+          </a:fontRef>
+        </p:style>
+        <p:txBody>
+          <a:bodyPr rtlCol="0" anchor="ctr"/>
+          <a:lstStyle/>
+          <a:p>
+            <a:pPr algn="ctr"/>
+            <a:r>
+              <a:rPr lang="en-US" dirty="0"/>
+              <a:t>Switch</a:t>
+            </a:r>
+          </a:p>
+        </p:txBody>
+      </p:sp>
+      <p:sp>
+        <p:nvSpPr>
+          <p:cNvPr id="37" name="Rectangle 36">
+            <a:extLst>
+              <a:ext uri="{FF2B5EF4-FFF2-40B4-BE49-F238E27FC236}">
+                <a16:creationId xmlns:a16="http://schemas.microsoft.com/office/drawing/2014/main" id="{AF06BA04-42F5-4D70-83F7-358D48A3C10C}"/>
+              </a:ext>
+            </a:extLst>
+          </p:cNvPr>
+          <p:cNvSpPr/>
+          <p:nvPr/>
+        </p:nvSpPr>
+        <p:spPr>
+          <a:xfrm>
+            <a:off x="7643674" y="5702154"/>
+            <a:ext cx="1260000" cy="831600"/>
+          </a:xfrm>
+          <a:prstGeom prst="rect">
+            <a:avLst/>
+          </a:prstGeom>
+          <a:solidFill>
+            <a:srgbClr val="FF0000"/>
+          </a:solidFill>
+          <a:ln>
+            <a:noFill/>
+          </a:ln>
+          <a:effectLst>
+            <a:outerShdw blurRad="44450" dist="27940" dir="5400000" algn="ctr">
+              <a:srgbClr val="000000">
+                <a:alpha val="32000"/>
+              </a:srgbClr>
+            </a:outerShdw>
+          </a:effectLst>
+          <a:scene3d>
+            <a:camera prst="orthographicFront">
+              <a:rot lat="0" lon="0" rev="0"/>
+            </a:camera>
+            <a:lightRig rig="balanced" dir="t">
+              <a:rot lat="0" lon="0" rev="8700000"/>
+            </a:lightRig>
+          </a:scene3d>
+          <a:sp3d>
+            <a:bevelT w="190500" h="38100"/>
+          </a:sp3d>
+        </p:spPr>
+        <p:style>
+          <a:lnRef idx="2">
+            <a:schemeClr val="accent1">
+              <a:shade val="50000"/>
+            </a:schemeClr>
+          </a:lnRef>
+          <a:fillRef idx="1">
+            <a:schemeClr val="accent1"/>
+          </a:fillRef>
+          <a:effectRef idx="0">
+            <a:schemeClr val="accent1"/>
+          </a:effectRef>
+          <a:fontRef idx="minor">
+            <a:schemeClr val="lt1"/>
+          </a:fontRef>
+        </p:style>
+        <p:txBody>
+          <a:bodyPr rtlCol="0" anchor="ctr"/>
+          <a:lstStyle/>
+          <a:p>
+            <a:pPr algn="ctr"/>
+            <a:r>
+              <a:rPr lang="en-US" dirty="0"/>
+              <a:t>Switch</a:t>
+            </a:r>
+          </a:p>
+        </p:txBody>
+      </p:sp>
+      <p:sp>
+        <p:nvSpPr>
+          <p:cNvPr id="38" name="Rectangle 37">
+            <a:extLst>
+              <a:ext uri="{FF2B5EF4-FFF2-40B4-BE49-F238E27FC236}">
+                <a16:creationId xmlns:a16="http://schemas.microsoft.com/office/drawing/2014/main" id="{9B5AFDFB-C277-42D7-BF53-182D06ED9CFE}"/>
+              </a:ext>
+            </a:extLst>
+          </p:cNvPr>
+          <p:cNvSpPr/>
+          <p:nvPr/>
+        </p:nvSpPr>
+        <p:spPr>
+          <a:xfrm>
+            <a:off x="9578373" y="2333976"/>
+            <a:ext cx="1260000" cy="831600"/>
+          </a:xfrm>
+          <a:prstGeom prst="rect">
+            <a:avLst/>
+          </a:prstGeom>
+          <a:solidFill>
+            <a:schemeClr val="accent6">
+              <a:lumMod val="75000"/>
+            </a:schemeClr>
+          </a:solidFill>
+          <a:ln>
+            <a:noFill/>
+          </a:ln>
+          <a:effectLst/>
+          <a:scene3d>
+            <a:camera prst="orthographicFront">
+              <a:rot lat="0" lon="0" rev="0"/>
+            </a:camera>
+            <a:lightRig rig="contrasting" dir="t">
+              <a:rot lat="0" lon="0" rev="7800000"/>
+            </a:lightRig>
+          </a:scene3d>
+          <a:sp3d>
+            <a:bevelT w="139700" h="139700"/>
+          </a:sp3d>
+        </p:spPr>
+        <p:style>
+          <a:lnRef idx="2">
+            <a:schemeClr val="accent1">
+              <a:shade val="50000"/>
+            </a:schemeClr>
+          </a:lnRef>
+          <a:fillRef idx="1">
+            <a:schemeClr val="accent1"/>
+          </a:fillRef>
+          <a:effectRef idx="0">
+            <a:schemeClr val="accent1"/>
+          </a:effectRef>
+          <a:fontRef idx="minor">
+            <a:schemeClr val="lt1"/>
+          </a:fontRef>
+        </p:style>
+        <p:txBody>
+          <a:bodyPr rtlCol="0" anchor="ctr"/>
+          <a:lstStyle/>
+          <a:p>
+            <a:pPr algn="ctr"/>
+            <a:r>
+              <a:rPr lang="en-US" dirty="0"/>
+              <a:t>Switch</a:t>
+            </a:r>
+          </a:p>
+        </p:txBody>
+      </p:sp>
+      <p:sp>
+        <p:nvSpPr>
+          <p:cNvPr id="10" name="TextBox 9">
+            <a:extLst>
+              <a:ext uri="{FF2B5EF4-FFF2-40B4-BE49-F238E27FC236}">
+                <a16:creationId xmlns:a16="http://schemas.microsoft.com/office/drawing/2014/main" id="{0C53C9C4-1382-4B40-AE47-A07E4034D12B}"/>
+              </a:ext>
+            </a:extLst>
+          </p:cNvPr>
+          <p:cNvSpPr txBox="1"/>
+          <p:nvPr/>
+        </p:nvSpPr>
+        <p:spPr>
+          <a:xfrm>
+            <a:off x="7563773" y="1912020"/>
+            <a:ext cx="4030463" cy="369332"/>
+          </a:xfrm>
+          <a:prstGeom prst="rect">
+            <a:avLst/>
+          </a:prstGeom>
+          <a:noFill/>
+        </p:spPr>
+        <p:txBody>
+          <a:bodyPr wrap="square" rtlCol="0">
+            <a:spAutoFit/>
+          </a:bodyPr>
+          <a:lstStyle/>
+          <a:p>
+            <a:r>
+              <a:rPr lang="en-US" dirty="0"/>
+              <a:t>Before(normal)___After(sunken)</a:t>
+            </a:r>
+          </a:p>
+        </p:txBody>
+      </p:sp>
+      <p:sp>
+        <p:nvSpPr>
+          <p:cNvPr id="39" name="Rectangle 38">
+            <a:extLst>
+              <a:ext uri="{FF2B5EF4-FFF2-40B4-BE49-F238E27FC236}">
+                <a16:creationId xmlns:a16="http://schemas.microsoft.com/office/drawing/2014/main" id="{7DA27359-A542-4FEC-B477-ED16D41C6809}"/>
+              </a:ext>
+            </a:extLst>
+          </p:cNvPr>
+          <p:cNvSpPr/>
+          <p:nvPr/>
+        </p:nvSpPr>
+        <p:spPr>
+          <a:xfrm>
+            <a:off x="9578373" y="3448301"/>
+            <a:ext cx="1260000" cy="831600"/>
+          </a:xfrm>
+          <a:prstGeom prst="rect">
+            <a:avLst/>
+          </a:prstGeom>
+          <a:solidFill>
+            <a:schemeClr val="accent6">
+              <a:lumMod val="75000"/>
+            </a:schemeClr>
+          </a:solidFill>
+          <a:ln>
+            <a:noFill/>
+          </a:ln>
+          <a:effectLst/>
+          <a:scene3d>
+            <a:camera prst="orthographicFront">
+              <a:rot lat="0" lon="0" rev="0"/>
+            </a:camera>
+            <a:lightRig rig="contrasting" dir="t">
+              <a:rot lat="0" lon="0" rev="7800000"/>
+            </a:lightRig>
+          </a:scene3d>
+          <a:sp3d>
+            <a:bevelT w="139700" h="139700"/>
+          </a:sp3d>
+        </p:spPr>
+        <p:style>
+          <a:lnRef idx="2">
+            <a:schemeClr val="accent1">
+              <a:shade val="50000"/>
+            </a:schemeClr>
+          </a:lnRef>
+          <a:fillRef idx="1">
+            <a:schemeClr val="accent1"/>
+          </a:fillRef>
+          <a:effectRef idx="0">
+            <a:schemeClr val="accent1"/>
+          </a:effectRef>
+          <a:fontRef idx="minor">
+            <a:schemeClr val="lt1"/>
+          </a:fontRef>
+        </p:style>
+        <p:txBody>
+          <a:bodyPr rtlCol="0" anchor="ctr"/>
+          <a:lstStyle/>
+          <a:p>
+            <a:pPr algn="ctr"/>
+            <a:r>
+              <a:rPr lang="en-US" dirty="0"/>
+              <a:t>Switch</a:t>
+            </a:r>
+          </a:p>
+        </p:txBody>
+      </p:sp>
+      <p:sp>
+        <p:nvSpPr>
+          <p:cNvPr id="40" name="Rectangle 39">
+            <a:extLst>
+              <a:ext uri="{FF2B5EF4-FFF2-40B4-BE49-F238E27FC236}">
+                <a16:creationId xmlns:a16="http://schemas.microsoft.com/office/drawing/2014/main" id="{81651193-D991-4BAA-81EB-12E05C753A67}"/>
+              </a:ext>
+            </a:extLst>
+          </p:cNvPr>
+          <p:cNvSpPr/>
+          <p:nvPr/>
+        </p:nvSpPr>
+        <p:spPr>
+          <a:xfrm>
+            <a:off x="9578373" y="4576619"/>
+            <a:ext cx="1260000" cy="831600"/>
+          </a:xfrm>
+          <a:prstGeom prst="rect">
+            <a:avLst/>
+          </a:prstGeom>
+          <a:solidFill>
+            <a:srgbClr val="FF0000"/>
+          </a:solidFill>
+          <a:ln>
+            <a:noFill/>
+          </a:ln>
+          <a:effectLst>
+            <a:outerShdw blurRad="44450" dist="27940" dir="5400000" algn="ctr">
+              <a:srgbClr val="000000">
+                <a:alpha val="32000"/>
+              </a:srgbClr>
+            </a:outerShdw>
+          </a:effectLst>
+          <a:scene3d>
+            <a:camera prst="orthographicFront">
+              <a:rot lat="0" lon="0" rev="0"/>
+            </a:camera>
+            <a:lightRig rig="balanced" dir="t">
+              <a:rot lat="0" lon="0" rev="8700000"/>
+            </a:lightRig>
+          </a:scene3d>
+          <a:sp3d>
+            <a:bevelT w="190500" h="38100"/>
+          </a:sp3d>
+        </p:spPr>
+        <p:style>
+          <a:lnRef idx="2">
+            <a:schemeClr val="accent1">
+              <a:shade val="50000"/>
+            </a:schemeClr>
+          </a:lnRef>
+          <a:fillRef idx="1">
+            <a:schemeClr val="accent1"/>
+          </a:fillRef>
+          <a:effectRef idx="0">
+            <a:schemeClr val="accent1"/>
+          </a:effectRef>
+          <a:fontRef idx="minor">
+            <a:schemeClr val="lt1"/>
+          </a:fontRef>
+        </p:style>
+        <p:txBody>
+          <a:bodyPr rtlCol="0" anchor="ctr"/>
+          <a:lstStyle/>
+          <a:p>
+            <a:pPr algn="ctr"/>
+            <a:r>
+              <a:rPr lang="en-US" dirty="0"/>
+              <a:t>Switch</a:t>
+            </a:r>
+          </a:p>
+        </p:txBody>
+      </p:sp>
+      <p:sp>
+        <p:nvSpPr>
+          <p:cNvPr id="41" name="Rectangle 40">
+            <a:extLst>
+              <a:ext uri="{FF2B5EF4-FFF2-40B4-BE49-F238E27FC236}">
+                <a16:creationId xmlns:a16="http://schemas.microsoft.com/office/drawing/2014/main" id="{A435562D-3D38-4098-8A87-C4DA2D45208B}"/>
+              </a:ext>
+            </a:extLst>
+          </p:cNvPr>
+          <p:cNvSpPr/>
+          <p:nvPr/>
+        </p:nvSpPr>
+        <p:spPr>
+          <a:xfrm>
+            <a:off x="9578373" y="5703018"/>
+            <a:ext cx="1260000" cy="831600"/>
+          </a:xfrm>
+          <a:prstGeom prst="rect">
+            <a:avLst/>
+          </a:prstGeom>
+          <a:solidFill>
+            <a:srgbClr val="FF0000"/>
+          </a:solidFill>
+          <a:ln>
+            <a:noFill/>
+          </a:ln>
+          <a:effectLst>
+            <a:outerShdw blurRad="44450" dist="27940" dir="5400000" algn="ctr">
+              <a:srgbClr val="000000">
+                <a:alpha val="32000"/>
+              </a:srgbClr>
+            </a:outerShdw>
+          </a:effectLst>
+          <a:scene3d>
+            <a:camera prst="orthographicFront">
+              <a:rot lat="0" lon="0" rev="0"/>
+            </a:camera>
+            <a:lightRig rig="balanced" dir="t">
+              <a:rot lat="0" lon="0" rev="8700000"/>
+            </a:lightRig>
+          </a:scene3d>
+          <a:sp3d>
+            <a:bevelT w="190500" h="38100"/>
+          </a:sp3d>
+        </p:spPr>
+        <p:style>
+          <a:lnRef idx="2">
+            <a:schemeClr val="accent1">
+              <a:shade val="50000"/>
+            </a:schemeClr>
+          </a:lnRef>
+          <a:fillRef idx="1">
+            <a:schemeClr val="accent1"/>
+          </a:fillRef>
+          <a:effectRef idx="0">
+            <a:schemeClr val="accent1"/>
+          </a:effectRef>
+          <a:fontRef idx="minor">
+            <a:schemeClr val="lt1"/>
+          </a:fontRef>
+        </p:style>
+        <p:txBody>
+          <a:bodyPr rtlCol="0" anchor="ctr"/>
+          <a:lstStyle/>
+          <a:p>
+            <a:pPr algn="ctr"/>
+            <a:r>
+              <a:rPr lang="en-US" dirty="0"/>
+              <a:t>Switch</a:t>
+            </a:r>
+          </a:p>
+        </p:txBody>
+      </p:sp>
+      <p:sp>
+        <p:nvSpPr>
+          <p:cNvPr id="11" name="Rectangle 10">
+            <a:extLst>
+              <a:ext uri="{FF2B5EF4-FFF2-40B4-BE49-F238E27FC236}">
+                <a16:creationId xmlns:a16="http://schemas.microsoft.com/office/drawing/2014/main" id="{11C9B6D0-9904-449D-8C9C-D767DAC370E2}"/>
+              </a:ext>
+            </a:extLst>
+          </p:cNvPr>
+          <p:cNvSpPr/>
+          <p:nvPr/>
+        </p:nvSpPr>
+        <p:spPr>
+          <a:xfrm>
+            <a:off x="9578373" y="177553"/>
+            <a:ext cx="2193417" cy="1638849"/>
+          </a:xfrm>
+          <a:prstGeom prst="rect">
+            <a:avLst/>
+          </a:prstGeom>
+          <a:solidFill>
+            <a:schemeClr val="bg1"/>
+          </a:solidFill>
+          <a:ln>
+            <a:solidFill>
+              <a:schemeClr val="tx1"/>
+            </a:solidFill>
+          </a:ln>
+        </p:spPr>
+        <p:style>
+          <a:lnRef idx="2">
+            <a:schemeClr val="accent1">
+              <a:shade val="50000"/>
+            </a:schemeClr>
+          </a:lnRef>
+          <a:fillRef idx="1">
+            <a:schemeClr val="accent1"/>
+          </a:fillRef>
+          <a:effectRef idx="0">
+            <a:schemeClr val="accent1"/>
+          </a:effectRef>
+          <a:fontRef idx="minor">
+            <a:schemeClr val="lt1"/>
+          </a:fontRef>
+        </p:style>
+        <p:txBody>
+          <a:bodyPr rtlCol="0" anchor="ctr"/>
+          <a:lstStyle/>
+          <a:p>
+            <a:pPr algn="ctr"/>
+            <a:r>
+              <a:rPr lang="en-US" dirty="0">
+                <a:solidFill>
+                  <a:sysClr val="windowText" lastClr="000000"/>
+                </a:solidFill>
+              </a:rPr>
+              <a:t>def function</a:t>
+            </a:r>
+          </a:p>
+        </p:txBody>
+      </p:sp>
+    </p:spTree>
+    <p:extLst>
+      <p:ext uri="{BB962C8B-B14F-4D97-AF65-F5344CB8AC3E}">
+        <p14:creationId xmlns:p14="http://schemas.microsoft.com/office/powerpoint/2010/main" val="3356060902"/>
+      </p:ext>
+    </p:extLst>
+  </p:cSld>
+  <p:clrMapOvr>
+    <a:masterClrMapping/>
+  </p:clrMapOvr>
+</p:sld>
+</file>
+
 <file path=ppt/theme/theme1.xml><?xml version="1.0" encoding="utf-8"?>
 <a:theme xmlns:a="http://schemas.openxmlformats.org/drawingml/2006/main" name="Office Theme">
   <a:themeElements>

</xml_diff>